<commit_message>
added some url's for github
</commit_message>
<xml_diff>
--- a/classes/prog2024/Prog3-Lecture12.pptx
+++ b/classes/prog2024/Prog3-Lecture12.pptx
@@ -296,7 +296,7 @@
           <a:p>
             <a:fld id="{5065B3F6-8445-4D54-AEB1-4976506209CF}" type="datetimeFigureOut">
               <a:rPr lang="en-US" smtClean="0"/>
-              <a:t>10/9/2024</a:t>
+              <a:t>10/11/2024</a:t>
             </a:fld>
             <a:endParaRPr lang="en-US"/>
           </a:p>
@@ -494,7 +494,7 @@
           <a:p>
             <a:fld id="{5065B3F6-8445-4D54-AEB1-4976506209CF}" type="datetimeFigureOut">
               <a:rPr lang="en-US" smtClean="0"/>
-              <a:t>10/9/2024</a:t>
+              <a:t>10/11/2024</a:t>
             </a:fld>
             <a:endParaRPr lang="en-US"/>
           </a:p>
@@ -702,7 +702,7 @@
           <a:p>
             <a:fld id="{5065B3F6-8445-4D54-AEB1-4976506209CF}" type="datetimeFigureOut">
               <a:rPr lang="en-US" smtClean="0"/>
-              <a:t>10/9/2024</a:t>
+              <a:t>10/11/2024</a:t>
             </a:fld>
             <a:endParaRPr lang="en-US"/>
           </a:p>
@@ -900,7 +900,7 @@
           <a:p>
             <a:fld id="{5065B3F6-8445-4D54-AEB1-4976506209CF}" type="datetimeFigureOut">
               <a:rPr lang="en-US" smtClean="0"/>
-              <a:t>10/9/2024</a:t>
+              <a:t>10/11/2024</a:t>
             </a:fld>
             <a:endParaRPr lang="en-US"/>
           </a:p>
@@ -1175,7 +1175,7 @@
           <a:p>
             <a:fld id="{5065B3F6-8445-4D54-AEB1-4976506209CF}" type="datetimeFigureOut">
               <a:rPr lang="en-US" smtClean="0"/>
-              <a:t>10/9/2024</a:t>
+              <a:t>10/11/2024</a:t>
             </a:fld>
             <a:endParaRPr lang="en-US"/>
           </a:p>
@@ -1440,7 +1440,7 @@
           <a:p>
             <a:fld id="{5065B3F6-8445-4D54-AEB1-4976506209CF}" type="datetimeFigureOut">
               <a:rPr lang="en-US" smtClean="0"/>
-              <a:t>10/9/2024</a:t>
+              <a:t>10/11/2024</a:t>
             </a:fld>
             <a:endParaRPr lang="en-US"/>
           </a:p>
@@ -1852,7 +1852,7 @@
           <a:p>
             <a:fld id="{5065B3F6-8445-4D54-AEB1-4976506209CF}" type="datetimeFigureOut">
               <a:rPr lang="en-US" smtClean="0"/>
-              <a:t>10/9/2024</a:t>
+              <a:t>10/11/2024</a:t>
             </a:fld>
             <a:endParaRPr lang="en-US"/>
           </a:p>
@@ -1993,7 +1993,7 @@
           <a:p>
             <a:fld id="{5065B3F6-8445-4D54-AEB1-4976506209CF}" type="datetimeFigureOut">
               <a:rPr lang="en-US" smtClean="0"/>
-              <a:t>10/9/2024</a:t>
+              <a:t>10/11/2024</a:t>
             </a:fld>
             <a:endParaRPr lang="en-US"/>
           </a:p>
@@ -2106,7 +2106,7 @@
           <a:p>
             <a:fld id="{5065B3F6-8445-4D54-AEB1-4976506209CF}" type="datetimeFigureOut">
               <a:rPr lang="en-US" smtClean="0"/>
-              <a:t>10/9/2024</a:t>
+              <a:t>10/11/2024</a:t>
             </a:fld>
             <a:endParaRPr lang="en-US"/>
           </a:p>
@@ -2417,7 +2417,7 @@
           <a:p>
             <a:fld id="{5065B3F6-8445-4D54-AEB1-4976506209CF}" type="datetimeFigureOut">
               <a:rPr lang="en-US" smtClean="0"/>
-              <a:t>10/9/2024</a:t>
+              <a:t>10/11/2024</a:t>
             </a:fld>
             <a:endParaRPr lang="en-US"/>
           </a:p>
@@ -2705,7 +2705,7 @@
           <a:p>
             <a:fld id="{5065B3F6-8445-4D54-AEB1-4976506209CF}" type="datetimeFigureOut">
               <a:rPr lang="en-US" smtClean="0"/>
-              <a:t>10/9/2024</a:t>
+              <a:t>10/11/2024</a:t>
             </a:fld>
             <a:endParaRPr lang="en-US"/>
           </a:p>
@@ -2946,7 +2946,7 @@
           <a:p>
             <a:fld id="{5065B3F6-8445-4D54-AEB1-4976506209CF}" type="datetimeFigureOut">
               <a:rPr lang="en-US" smtClean="0"/>
-              <a:t>10/9/2024</a:t>
+              <a:t>10/11/2024</a:t>
             </a:fld>
             <a:endParaRPr lang="en-US"/>
           </a:p>
@@ -7238,7 +7238,7 @@
         </p:nvSpPr>
         <p:spPr>
           <a:xfrm>
-            <a:off x="344033" y="5880807"/>
+            <a:off x="344033" y="5636368"/>
             <a:ext cx="1781321" cy="646331"/>
           </a:xfrm>
           <a:prstGeom prst="rect">
@@ -7279,7 +7279,7 @@
         </p:nvCxnSpPr>
         <p:spPr>
           <a:xfrm>
-            <a:off x="2408223" y="6188626"/>
+            <a:off x="2408223" y="5944187"/>
             <a:ext cx="633742" cy="0"/>
           </a:xfrm>
           <a:prstGeom prst="straightConnector1">
@@ -7318,7 +7318,7 @@
         </p:nvSpPr>
         <p:spPr>
           <a:xfrm>
-            <a:off x="3204931" y="5880810"/>
+            <a:off x="3204931" y="5636371"/>
             <a:ext cx="1440523" cy="646331"/>
           </a:xfrm>
           <a:prstGeom prst="rect">
@@ -7359,7 +7359,7 @@
         </p:nvCxnSpPr>
         <p:spPr>
           <a:xfrm>
-            <a:off x="5080504" y="6203972"/>
+            <a:off x="5080504" y="5959533"/>
             <a:ext cx="633742" cy="0"/>
           </a:xfrm>
           <a:prstGeom prst="straightConnector1">
@@ -7398,7 +7398,7 @@
         </p:nvSpPr>
         <p:spPr>
           <a:xfrm>
-            <a:off x="5939076" y="5853650"/>
+            <a:off x="5939076" y="5609211"/>
             <a:ext cx="1440523" cy="646331"/>
           </a:xfrm>
           <a:prstGeom prst="rect">
@@ -7439,7 +7439,7 @@
         </p:nvCxnSpPr>
         <p:spPr>
           <a:xfrm>
-            <a:off x="7478163" y="6204811"/>
+            <a:off x="7478163" y="5960372"/>
             <a:ext cx="633742" cy="0"/>
           </a:xfrm>
           <a:prstGeom prst="straightConnector1">
@@ -7478,7 +7478,7 @@
         </p:nvSpPr>
         <p:spPr>
           <a:xfrm>
-            <a:off x="8157174" y="5893807"/>
+            <a:off x="8157174" y="5649368"/>
             <a:ext cx="2659702" cy="646331"/>
           </a:xfrm>
           <a:prstGeom prst="rect">
@@ -7521,6 +7521,41 @@
                 <a:cs typeface="Arial" panose="020B0604020202020204" pitchFamily="34" charset="0"/>
               </a:rPr>
               <a:t>)</a:t>
+            </a:r>
+          </a:p>
+        </p:txBody>
+      </p:sp>
+      <p:sp>
+        <p:nvSpPr>
+          <p:cNvPr id="3" name="TextBox 2">
+            <a:extLst>
+              <a:ext uri="{FF2B5EF4-FFF2-40B4-BE49-F238E27FC236}">
+                <a16:creationId xmlns:a16="http://schemas.microsoft.com/office/drawing/2014/main" id="{AD8D8892-586F-F5EE-0293-35685383A79C}"/>
+              </a:ext>
+            </a:extLst>
+          </p:cNvPr>
+          <p:cNvSpPr txBox="1"/>
+          <p:nvPr/>
+        </p:nvSpPr>
+        <p:spPr>
+          <a:xfrm>
+            <a:off x="3673441" y="6488668"/>
+            <a:ext cx="10386588" cy="307777"/>
+          </a:xfrm>
+          <a:prstGeom prst="rect">
+            <a:avLst/>
+          </a:prstGeom>
+          <a:noFill/>
+        </p:spPr>
+        <p:txBody>
+          <a:bodyPr wrap="square">
+            <a:spAutoFit/>
+          </a:bodyPr>
+          <a:lstStyle/>
+          <a:p>
+            <a:r>
+              <a:rPr lang="en-US" sz="1400" dirty="0"/>
+              <a:t>https://github.com/afodor/mnistMaven/blob/main/src/main/java/mnist/MNISTClassifier.java</a:t>
             </a:r>
           </a:p>
         </p:txBody>
@@ -8515,6 +8550,41 @@
           </a:prstGeom>
         </p:spPr>
       </p:pic>
+      <p:sp>
+        <p:nvSpPr>
+          <p:cNvPr id="7" name="TextBox 6">
+            <a:extLst>
+              <a:ext uri="{FF2B5EF4-FFF2-40B4-BE49-F238E27FC236}">
+                <a16:creationId xmlns:a16="http://schemas.microsoft.com/office/drawing/2014/main" id="{4B1D9315-B3A1-D46B-3A96-06D223E03032}"/>
+              </a:ext>
+            </a:extLst>
+          </p:cNvPr>
+          <p:cNvSpPr txBox="1"/>
+          <p:nvPr/>
+        </p:nvSpPr>
+        <p:spPr>
+          <a:xfrm>
+            <a:off x="3030647" y="6488668"/>
+            <a:ext cx="9589883" cy="369332"/>
+          </a:xfrm>
+          <a:prstGeom prst="rect">
+            <a:avLst/>
+          </a:prstGeom>
+          <a:noFill/>
+        </p:spPr>
+        <p:txBody>
+          <a:bodyPr wrap="square">
+            <a:spAutoFit/>
+          </a:bodyPr>
+          <a:lstStyle/>
+          <a:p>
+            <a:r>
+              <a:rPr lang="en-US" dirty="0"/>
+              <a:t>https://github.com/afodor/mnistMaven/blob/main/src/main/java/mnist/plotResults.txt</a:t>
+            </a:r>
+          </a:p>
+        </p:txBody>
+      </p:sp>
     </p:spTree>
     <p:extLst>
       <p:ext uri="{BB962C8B-B14F-4D97-AF65-F5344CB8AC3E}">

</xml_diff>